<commit_message>
edits on slides 12f,13mw
</commit_message>
<xml_diff>
--- a/restricted/slides12f.pptx
+++ b/restricted/slides12f.pptx
@@ -5470,11 +5470,7 @@
             </a:r>
             <a:r>
               <a:rPr lang="en-US" dirty="0" smtClean="0"/>
-              <a:t> </a:t>
-            </a:r>
-            <a:r>
-              <a:rPr lang="en-US" dirty="0" smtClean="0"/>
-              <a:t>12F.</a:t>
+              <a:t> 12F.</a:t>
             </a:r>
             <a:fld id="{B9A0B45D-6AFD-413C-B761-B121FB8BE940}" type="slidenum">
               <a:rPr lang="en-US" smtClean="0"/>
@@ -5570,22 +5566,7 @@
                 <a:uFillTx/>
                 <a:latin typeface="Comic Sans MS" pitchFamily="66" charset="0"/>
               </a:rPr>
-              <a:t>Albert R Meyer</a:t>
-            </a:r>
-            <a:r>
-              <a:rPr kumimoji="0" lang="en-US" sz="1200" b="0" i="0" u="none" strike="noStrike" kern="1200" cap="none" spc="0" normalizeH="0" baseline="0" noProof="0" dirty="0" smtClean="0">
-                <a:ln>
-                  <a:noFill/>
-                </a:ln>
-                <a:solidFill>
-                  <a:schemeClr val="tx1"/>
-                </a:solidFill>
-                <a:effectLst/>
-                <a:uLnTx/>
-                <a:uFillTx/>
-                <a:latin typeface="Comic Sans MS" pitchFamily="66" charset="0"/>
-              </a:rPr>
-              <a:t>,            April 30, 2010</a:t>
+              <a:t>Albert R Meyer,            April 30, 2010</a:t>
             </a:r>
             <a:endParaRPr kumimoji="0" lang="en-US" sz="1200" b="0" i="0" u="none" strike="noStrike" kern="1200" cap="none" spc="0" normalizeH="0" baseline="0" noProof="0" dirty="0">
               <a:ln>
@@ -6341,7 +6322,7 @@
 </file>
 
 <file path=ppt/slides/slide10.xml><?xml version="1.0" encoding="utf-8"?>
-<p:sld xmlns:a="http://schemas.openxmlformats.org/drawingml/2006/main" xmlns:r="http://schemas.openxmlformats.org/officeDocument/2006/relationships" xmlns:mc="http://schemas.openxmlformats.org/markup-compatibility/2006" xmlns:mv="urn:schemas-microsoft-com:mac:vml" xmlns:p="http://schemas.openxmlformats.org/presentationml/2006/main" mc:Ignorable="mv" mc:PreserveAttributes="mv:*" show="0">
+<p:sld xmlns:a="http://schemas.openxmlformats.org/drawingml/2006/main" xmlns:r="http://schemas.openxmlformats.org/officeDocument/2006/relationships" xmlns:mc="http://schemas.openxmlformats.org/markup-compatibility/2006" xmlns:mv="urn:schemas-microsoft-com:mac:vml" xmlns:p="http://schemas.openxmlformats.org/presentationml/2006/main" mc:Ignorable="mv" mc:PreserveAttributes="mv:*">
   <p:cSld>
     <p:spTree>
       <p:nvGrpSpPr>
@@ -26679,7 +26660,27 @@
             </a:pPr>
             <a:r>
               <a:rPr lang="en-US" sz="4800" dirty="0" smtClean="0"/>
-              <a:t>  Deciding whether to treat them as independent is a matter experiment, not Mathematics.</a:t>
+              <a:t>  Deciding whether to treat them as independent is a </a:t>
+            </a:r>
+            <a:r>
+              <a:rPr lang="en-US" sz="4800" smtClean="0"/>
+              <a:t>matter</a:t>
+            </a:r>
+            <a:r>
+              <a:rPr lang="en-US" sz="4800" smtClean="0"/>
+              <a:t> </a:t>
+            </a:r>
+            <a:r>
+              <a:rPr lang="en-US" sz="4800" smtClean="0"/>
+              <a:t>of</a:t>
+            </a:r>
+            <a:r>
+              <a:rPr lang="en-US" sz="4800" smtClean="0"/>
+              <a:t> experiment</a:t>
+            </a:r>
+            <a:r>
+              <a:rPr lang="en-US" sz="4800" dirty="0" smtClean="0"/>
+              <a:t>, not Mathematics.</a:t>
             </a:r>
           </a:p>
         </p:txBody>

</xml_diff>